<commit_message>
added investor pitch video
</commit_message>
<xml_diff>
--- a/pitch/Investors pitch.pptx
+++ b/pitch/Investors pitch.pptx
@@ -1193,7 +1193,7 @@
           <a:p>
             <a:fld id="{20630491-59BB-DD47-A259-D7C351DF458B}" type="datetimeFigureOut">
               <a:rPr lang="en-CH" smtClean="0"/>
-              <a:t>12/20/2021</a:t>
+              <a:t>12/21/2021</a:t>
             </a:fld>
             <a:endParaRPr lang="en-CH"/>
           </a:p>
@@ -1352,7 +1352,7 @@
           <a:p>
             <a:fld id="{96A4DF89-15AD-0745-8412-D78E22AFBAFD}" type="slidenum">
               <a:rPr lang="en-CH" smtClean="0"/>
-              <a:t>‹#›</a:t>
+              <a:t>‹Nr.›</a:t>
             </a:fld>
             <a:endParaRPr lang="en-CH"/>
           </a:p>
@@ -2133,7 +2133,7 @@
           <a:p>
             <a:fld id="{A751B95C-C172-5F4F-A436-67BCC42E389D}" type="datetimeFigureOut">
               <a:rPr lang="en-CH" smtClean="0"/>
-              <a:t>12/20/2021</a:t>
+              <a:t>12/21/2021</a:t>
             </a:fld>
             <a:endParaRPr lang="en-CH"/>
           </a:p>
@@ -2187,7 +2187,7 @@
           <a:p>
             <a:fld id="{5AFEFD6E-1CBC-8747-BB52-55ED67424BD6}" type="slidenum">
               <a:rPr lang="en-CH" smtClean="0"/>
-              <a:t>‹#›</a:t>
+              <a:t>‹Nr.›</a:t>
             </a:fld>
             <a:endParaRPr lang="en-CH"/>
           </a:p>
@@ -2333,7 +2333,7 @@
           <a:p>
             <a:fld id="{A751B95C-C172-5F4F-A436-67BCC42E389D}" type="datetimeFigureOut">
               <a:rPr lang="en-CH" smtClean="0"/>
-              <a:t>12/20/2021</a:t>
+              <a:t>12/21/2021</a:t>
             </a:fld>
             <a:endParaRPr lang="en-CH"/>
           </a:p>
@@ -2387,7 +2387,7 @@
           <a:p>
             <a:fld id="{5AFEFD6E-1CBC-8747-BB52-55ED67424BD6}" type="slidenum">
               <a:rPr lang="en-CH" smtClean="0"/>
-              <a:t>‹#›</a:t>
+              <a:t>‹Nr.›</a:t>
             </a:fld>
             <a:endParaRPr lang="en-CH"/>
           </a:p>
@@ -2543,7 +2543,7 @@
           <a:p>
             <a:fld id="{A751B95C-C172-5F4F-A436-67BCC42E389D}" type="datetimeFigureOut">
               <a:rPr lang="en-CH" smtClean="0"/>
-              <a:t>12/20/2021</a:t>
+              <a:t>12/21/2021</a:t>
             </a:fld>
             <a:endParaRPr lang="en-CH"/>
           </a:p>
@@ -2597,7 +2597,7 @@
           <a:p>
             <a:fld id="{5AFEFD6E-1CBC-8747-BB52-55ED67424BD6}" type="slidenum">
               <a:rPr lang="en-CH" smtClean="0"/>
-              <a:t>‹#›</a:t>
+              <a:t>‹Nr.›</a:t>
             </a:fld>
             <a:endParaRPr lang="en-CH"/>
           </a:p>
@@ -2743,7 +2743,7 @@
           <a:p>
             <a:fld id="{A751B95C-C172-5F4F-A436-67BCC42E389D}" type="datetimeFigureOut">
               <a:rPr lang="en-CH" smtClean="0"/>
-              <a:t>12/20/2021</a:t>
+              <a:t>12/21/2021</a:t>
             </a:fld>
             <a:endParaRPr lang="en-CH"/>
           </a:p>
@@ -2797,7 +2797,7 @@
           <a:p>
             <a:fld id="{5AFEFD6E-1CBC-8747-BB52-55ED67424BD6}" type="slidenum">
               <a:rPr lang="en-CH" smtClean="0"/>
-              <a:t>‹#›</a:t>
+              <a:t>‹Nr.›</a:t>
             </a:fld>
             <a:endParaRPr lang="en-CH"/>
           </a:p>
@@ -3019,7 +3019,7 @@
           <a:p>
             <a:fld id="{A751B95C-C172-5F4F-A436-67BCC42E389D}" type="datetimeFigureOut">
               <a:rPr lang="en-CH" smtClean="0"/>
-              <a:t>12/20/2021</a:t>
+              <a:t>12/21/2021</a:t>
             </a:fld>
             <a:endParaRPr lang="en-CH"/>
           </a:p>
@@ -3073,7 +3073,7 @@
           <a:p>
             <a:fld id="{5AFEFD6E-1CBC-8747-BB52-55ED67424BD6}" type="slidenum">
               <a:rPr lang="en-CH" smtClean="0"/>
-              <a:t>‹#›</a:t>
+              <a:t>‹Nr.›</a:t>
             </a:fld>
             <a:endParaRPr lang="en-CH"/>
           </a:p>
@@ -3287,7 +3287,7 @@
           <a:p>
             <a:fld id="{A751B95C-C172-5F4F-A436-67BCC42E389D}" type="datetimeFigureOut">
               <a:rPr lang="en-CH" smtClean="0"/>
-              <a:t>12/20/2021</a:t>
+              <a:t>12/21/2021</a:t>
             </a:fld>
             <a:endParaRPr lang="en-CH"/>
           </a:p>
@@ -3341,7 +3341,7 @@
           <a:p>
             <a:fld id="{5AFEFD6E-1CBC-8747-BB52-55ED67424BD6}" type="slidenum">
               <a:rPr lang="en-CH" smtClean="0"/>
-              <a:t>‹#›</a:t>
+              <a:t>‹Nr.›</a:t>
             </a:fld>
             <a:endParaRPr lang="en-CH"/>
           </a:p>
@@ -3702,7 +3702,7 @@
           <a:p>
             <a:fld id="{A751B95C-C172-5F4F-A436-67BCC42E389D}" type="datetimeFigureOut">
               <a:rPr lang="en-CH" smtClean="0"/>
-              <a:t>12/20/2021</a:t>
+              <a:t>12/21/2021</a:t>
             </a:fld>
             <a:endParaRPr lang="en-CH"/>
           </a:p>
@@ -3756,7 +3756,7 @@
           <a:p>
             <a:fld id="{5AFEFD6E-1CBC-8747-BB52-55ED67424BD6}" type="slidenum">
               <a:rPr lang="en-CH" smtClean="0"/>
-              <a:t>‹#›</a:t>
+              <a:t>‹Nr.›</a:t>
             </a:fld>
             <a:endParaRPr lang="en-CH"/>
           </a:p>
@@ -3844,7 +3844,7 @@
           <a:p>
             <a:fld id="{A751B95C-C172-5F4F-A436-67BCC42E389D}" type="datetimeFigureOut">
               <a:rPr lang="en-CH" smtClean="0"/>
-              <a:t>12/20/2021</a:t>
+              <a:t>12/21/2021</a:t>
             </a:fld>
             <a:endParaRPr lang="en-CH"/>
           </a:p>
@@ -3898,7 +3898,7 @@
           <a:p>
             <a:fld id="{5AFEFD6E-1CBC-8747-BB52-55ED67424BD6}" type="slidenum">
               <a:rPr lang="en-CH" smtClean="0"/>
-              <a:t>‹#›</a:t>
+              <a:t>‹Nr.›</a:t>
             </a:fld>
             <a:endParaRPr lang="en-CH"/>
           </a:p>
@@ -3957,7 +3957,7 @@
           <a:p>
             <a:fld id="{A751B95C-C172-5F4F-A436-67BCC42E389D}" type="datetimeFigureOut">
               <a:rPr lang="en-CH" smtClean="0"/>
-              <a:t>12/20/2021</a:t>
+              <a:t>12/21/2021</a:t>
             </a:fld>
             <a:endParaRPr lang="en-CH"/>
           </a:p>
@@ -4011,7 +4011,7 @@
           <a:p>
             <a:fld id="{5AFEFD6E-1CBC-8747-BB52-55ED67424BD6}" type="slidenum">
               <a:rPr lang="en-CH" smtClean="0"/>
-              <a:t>‹#›</a:t>
+              <a:t>‹Nr.›</a:t>
             </a:fld>
             <a:endParaRPr lang="en-CH"/>
           </a:p>
@@ -4270,7 +4270,7 @@
           <a:p>
             <a:fld id="{A751B95C-C172-5F4F-A436-67BCC42E389D}" type="datetimeFigureOut">
               <a:rPr lang="en-CH" smtClean="0"/>
-              <a:t>12/20/2021</a:t>
+              <a:t>12/21/2021</a:t>
             </a:fld>
             <a:endParaRPr lang="en-CH"/>
           </a:p>
@@ -4324,7 +4324,7 @@
           <a:p>
             <a:fld id="{5AFEFD6E-1CBC-8747-BB52-55ED67424BD6}" type="slidenum">
               <a:rPr lang="en-CH" smtClean="0"/>
-              <a:t>‹#›</a:t>
+              <a:t>‹Nr.›</a:t>
             </a:fld>
             <a:endParaRPr lang="en-CH"/>
           </a:p>
@@ -4559,7 +4559,7 @@
           <a:p>
             <a:fld id="{A751B95C-C172-5F4F-A436-67BCC42E389D}" type="datetimeFigureOut">
               <a:rPr lang="en-CH" smtClean="0"/>
-              <a:t>12/20/2021</a:t>
+              <a:t>12/21/2021</a:t>
             </a:fld>
             <a:endParaRPr lang="en-CH"/>
           </a:p>
@@ -4613,7 +4613,7 @@
           <a:p>
             <a:fld id="{5AFEFD6E-1CBC-8747-BB52-55ED67424BD6}" type="slidenum">
               <a:rPr lang="en-CH" smtClean="0"/>
-              <a:t>‹#›</a:t>
+              <a:t>‹Nr.›</a:t>
             </a:fld>
             <a:endParaRPr lang="en-CH"/>
           </a:p>
@@ -4802,7 +4802,7 @@
           <a:p>
             <a:fld id="{A751B95C-C172-5F4F-A436-67BCC42E389D}" type="datetimeFigureOut">
               <a:rPr lang="en-CH" smtClean="0"/>
-              <a:t>12/20/2021</a:t>
+              <a:t>12/21/2021</a:t>
             </a:fld>
             <a:endParaRPr lang="en-CH"/>
           </a:p>
@@ -4892,7 +4892,7 @@
           <a:p>
             <a:fld id="{5AFEFD6E-1CBC-8747-BB52-55ED67424BD6}" type="slidenum">
               <a:rPr lang="en-CH" smtClean="0"/>
-              <a:t>‹#›</a:t>
+              <a:t>‹Nr.›</a:t>
             </a:fld>
             <a:endParaRPr lang="en-CH"/>
           </a:p>
@@ -5673,6 +5673,18 @@
           <a:p>
             <a:pPr algn="just"/>
             <a:r>
+              <a:rPr lang="en-US" b="1" dirty="0">
+                <a:solidFill>
+                  <a:schemeClr val="tx1">
+                    <a:lumMod val="65000"/>
+                    <a:lumOff val="35000"/>
+                  </a:schemeClr>
+                </a:solidFill>
+                <a:latin typeface="+mj-lt"/>
+              </a:rPr>
+              <a:t>Difficult to keep up </a:t>
+            </a:r>
+            <a:r>
               <a:rPr lang="en-US" dirty="0">
                 <a:solidFill>
                   <a:schemeClr val="tx1">
@@ -5682,7 +5694,7 @@
                 </a:solidFill>
                 <a:latin typeface="+mj-lt"/>
               </a:rPr>
-              <a:t>Difficult to keep up with pharmacies operating as large chains and therefore have more possibilities and resources</a:t>
+              <a:t>with pharmacies operating as large chains and therefore have more possibilities and resources</a:t>
             </a:r>
             <a:endParaRPr lang="de-CH" dirty="0">
               <a:solidFill>
@@ -5726,6 +5738,138 @@
           <a:p>
             <a:pPr algn="just"/>
             <a:r>
+              <a:rPr lang="de-CH" b="1" dirty="0" err="1">
+                <a:solidFill>
+                  <a:schemeClr val="tx1">
+                    <a:lumMod val="65000"/>
+                    <a:lumOff val="35000"/>
+                  </a:schemeClr>
+                </a:solidFill>
+                <a:latin typeface="+mj-lt"/>
+              </a:rPr>
+              <a:t>No</a:t>
+            </a:r>
+            <a:r>
+              <a:rPr lang="de-CH" b="1" dirty="0">
+                <a:solidFill>
+                  <a:schemeClr val="tx1">
+                    <a:lumMod val="65000"/>
+                    <a:lumOff val="35000"/>
+                  </a:schemeClr>
+                </a:solidFill>
+                <a:latin typeface="+mj-lt"/>
+              </a:rPr>
+              <a:t> </a:t>
+            </a:r>
+            <a:r>
+              <a:rPr lang="de-CH" b="1" dirty="0" err="1">
+                <a:solidFill>
+                  <a:schemeClr val="tx1">
+                    <a:lumMod val="65000"/>
+                    <a:lumOff val="35000"/>
+                  </a:schemeClr>
+                </a:solidFill>
+                <a:latin typeface="+mj-lt"/>
+              </a:rPr>
+              <a:t>or</a:t>
+            </a:r>
+            <a:r>
+              <a:rPr lang="de-CH" b="1" dirty="0">
+                <a:solidFill>
+                  <a:schemeClr val="tx1">
+                    <a:lumMod val="65000"/>
+                    <a:lumOff val="35000"/>
+                  </a:schemeClr>
+                </a:solidFill>
+                <a:latin typeface="+mj-lt"/>
+              </a:rPr>
+              <a:t> not </a:t>
+            </a:r>
+            <a:r>
+              <a:rPr lang="de-CH" b="1" dirty="0" err="1">
+                <a:solidFill>
+                  <a:schemeClr val="tx1">
+                    <a:lumMod val="65000"/>
+                    <a:lumOff val="35000"/>
+                  </a:schemeClr>
+                </a:solidFill>
+                <a:latin typeface="+mj-lt"/>
+              </a:rPr>
+              <a:t>complete</a:t>
+            </a:r>
+            <a:r>
+              <a:rPr lang="de-CH" b="1" dirty="0">
+                <a:solidFill>
+                  <a:schemeClr val="tx1">
+                    <a:lumMod val="65000"/>
+                    <a:lumOff val="35000"/>
+                  </a:schemeClr>
+                </a:solidFill>
+                <a:latin typeface="+mj-lt"/>
+              </a:rPr>
+              <a:t> </a:t>
+            </a:r>
+            <a:r>
+              <a:rPr lang="de-CH" b="1" dirty="0" err="1">
+                <a:solidFill>
+                  <a:schemeClr val="tx1">
+                    <a:lumMod val="65000"/>
+                    <a:lumOff val="35000"/>
+                  </a:schemeClr>
+                </a:solidFill>
+                <a:latin typeface="+mj-lt"/>
+              </a:rPr>
+              <a:t>view</a:t>
+            </a:r>
+            <a:r>
+              <a:rPr lang="de-CH" b="1" dirty="0">
+                <a:solidFill>
+                  <a:schemeClr val="tx1">
+                    <a:lumMod val="65000"/>
+                    <a:lumOff val="35000"/>
+                  </a:schemeClr>
+                </a:solidFill>
+                <a:latin typeface="+mj-lt"/>
+              </a:rPr>
+              <a:t> on </a:t>
+            </a:r>
+            <a:r>
+              <a:rPr lang="de-CH" b="1" dirty="0" err="1">
+                <a:solidFill>
+                  <a:schemeClr val="tx1">
+                    <a:lumMod val="65000"/>
+                    <a:lumOff val="35000"/>
+                  </a:schemeClr>
+                </a:solidFill>
+                <a:latin typeface="+mj-lt"/>
+              </a:rPr>
+              <a:t>orders</a:t>
+            </a:r>
+            <a:r>
+              <a:rPr lang="de-CH" b="1" dirty="0">
+                <a:solidFill>
+                  <a:schemeClr val="tx1">
+                    <a:lumMod val="65000"/>
+                    <a:lumOff val="35000"/>
+                  </a:schemeClr>
+                </a:solidFill>
+                <a:latin typeface="+mj-lt"/>
+              </a:rPr>
+              <a:t> </a:t>
+            </a:r>
+            <a:r>
+              <a:rPr lang="de-CH" dirty="0">
+                <a:solidFill>
+                  <a:schemeClr val="tx1">
+                    <a:lumMod val="65000"/>
+                    <a:lumOff val="35000"/>
+                  </a:schemeClr>
+                </a:solidFill>
+                <a:latin typeface="+mj-lt"/>
+              </a:rPr>
+              <a:t>and </a:t>
+            </a:r>
+            <a:r>
               <a:rPr lang="de-CH" dirty="0" err="1">
                 <a:solidFill>
                   <a:schemeClr val="tx1">
@@ -5735,7 +5879,7 @@
                 </a:solidFill>
                 <a:latin typeface="+mj-lt"/>
               </a:rPr>
-              <a:t>No</a:t>
+              <a:t>patients</a:t>
             </a:r>
             <a:r>
               <a:rPr lang="de-CH" dirty="0">
@@ -5759,31 +5903,7 @@
                 </a:solidFill>
                 <a:latin typeface="+mj-lt"/>
               </a:rPr>
-              <a:t>or</a:t>
-            </a:r>
-            <a:r>
-              <a:rPr lang="de-CH" dirty="0">
-                <a:solidFill>
-                  <a:schemeClr val="tx1">
-                    <a:lumMod val="65000"/>
-                    <a:lumOff val="35000"/>
-                  </a:schemeClr>
-                </a:solidFill>
-                <a:latin typeface="+mj-lt"/>
-              </a:rPr>
-              <a:t> not </a:t>
-            </a:r>
-            <a:r>
-              <a:rPr lang="de-CH" dirty="0" err="1">
-                <a:solidFill>
-                  <a:schemeClr val="tx1">
-                    <a:lumMod val="65000"/>
-                    <a:lumOff val="35000"/>
-                  </a:schemeClr>
-                </a:solidFill>
-                <a:latin typeface="+mj-lt"/>
-              </a:rPr>
-              <a:t>complete</a:t>
+              <a:t>history</a:t>
             </a:r>
             <a:r>
               <a:rPr lang="de-CH" dirty="0">
@@ -5807,55 +5927,7 @@
                 </a:solidFill>
                 <a:latin typeface="+mj-lt"/>
               </a:rPr>
-              <a:t>view</a:t>
-            </a:r>
-            <a:r>
-              <a:rPr lang="de-CH" dirty="0">
-                <a:solidFill>
-                  <a:schemeClr val="tx1">
-                    <a:lumMod val="65000"/>
-                    <a:lumOff val="35000"/>
-                  </a:schemeClr>
-                </a:solidFill>
-                <a:latin typeface="+mj-lt"/>
-              </a:rPr>
-              <a:t> on </a:t>
-            </a:r>
-            <a:r>
-              <a:rPr lang="de-CH" dirty="0" err="1">
-                <a:solidFill>
-                  <a:schemeClr val="tx1">
-                    <a:lumMod val="65000"/>
-                    <a:lumOff val="35000"/>
-                  </a:schemeClr>
-                </a:solidFill>
-                <a:latin typeface="+mj-lt"/>
-              </a:rPr>
-              <a:t>orders</a:t>
-            </a:r>
-            <a:r>
-              <a:rPr lang="de-CH" dirty="0">
-                <a:solidFill>
-                  <a:schemeClr val="tx1">
-                    <a:lumMod val="65000"/>
-                    <a:lumOff val="35000"/>
-                  </a:schemeClr>
-                </a:solidFill>
-                <a:latin typeface="+mj-lt"/>
-              </a:rPr>
-              <a:t> and </a:t>
-            </a:r>
-            <a:r>
-              <a:rPr lang="de-CH" dirty="0" err="1">
-                <a:solidFill>
-                  <a:schemeClr val="tx1">
-                    <a:lumMod val="65000"/>
-                    <a:lumOff val="35000"/>
-                  </a:schemeClr>
-                </a:solidFill>
-                <a:latin typeface="+mj-lt"/>
-              </a:rPr>
-              <a:t>patients</a:t>
+              <a:t>can</a:t>
             </a:r>
             <a:r>
               <a:rPr lang="de-CH" dirty="0">
@@ -5879,7 +5951,7 @@
                 </a:solidFill>
                 <a:latin typeface="+mj-lt"/>
               </a:rPr>
-              <a:t>history</a:t>
+              <a:t>lead</a:t>
             </a:r>
             <a:r>
               <a:rPr lang="de-CH" dirty="0">
@@ -5903,7 +5975,7 @@
                 </a:solidFill>
                 <a:latin typeface="+mj-lt"/>
               </a:rPr>
-              <a:t>can</a:t>
+              <a:t>to</a:t>
             </a:r>
             <a:r>
               <a:rPr lang="de-CH" dirty="0">
@@ -5927,7 +5999,7 @@
                 </a:solidFill>
                 <a:latin typeface="+mj-lt"/>
               </a:rPr>
-              <a:t>lead</a:t>
+              <a:t>abuse</a:t>
             </a:r>
             <a:r>
               <a:rPr lang="de-CH" dirty="0">
@@ -5951,7 +6023,7 @@
                 </a:solidFill>
                 <a:latin typeface="+mj-lt"/>
               </a:rPr>
-              <a:t>to</a:t>
+              <a:t>or</a:t>
             </a:r>
             <a:r>
               <a:rPr lang="de-CH" dirty="0">
@@ -5975,7 +6047,7 @@
                 </a:solidFill>
                 <a:latin typeface="+mj-lt"/>
               </a:rPr>
-              <a:t>abuse</a:t>
+              <a:t>incorrect</a:t>
             </a:r>
             <a:r>
               <a:rPr lang="de-CH" dirty="0">
@@ -5999,7 +6071,7 @@
                 </a:solidFill>
                 <a:latin typeface="+mj-lt"/>
               </a:rPr>
-              <a:t>or</a:t>
+              <a:t>usage</a:t>
             </a:r>
             <a:r>
               <a:rPr lang="de-CH" dirty="0">
@@ -6023,7 +6095,7 @@
                 </a:solidFill>
                 <a:latin typeface="+mj-lt"/>
               </a:rPr>
-              <a:t>incorrect</a:t>
+              <a:t>of</a:t>
             </a:r>
             <a:r>
               <a:rPr lang="de-CH" dirty="0">
@@ -6047,54 +6119,6 @@
                 </a:solidFill>
                 <a:latin typeface="+mj-lt"/>
               </a:rPr>
-              <a:t>usage</a:t>
-            </a:r>
-            <a:r>
-              <a:rPr lang="de-CH" dirty="0">
-                <a:solidFill>
-                  <a:schemeClr val="tx1">
-                    <a:lumMod val="65000"/>
-                    <a:lumOff val="35000"/>
-                  </a:schemeClr>
-                </a:solidFill>
-                <a:latin typeface="+mj-lt"/>
-              </a:rPr>
-              <a:t> </a:t>
-            </a:r>
-            <a:r>
-              <a:rPr lang="de-CH" dirty="0" err="1">
-                <a:solidFill>
-                  <a:schemeClr val="tx1">
-                    <a:lumMod val="65000"/>
-                    <a:lumOff val="35000"/>
-                  </a:schemeClr>
-                </a:solidFill>
-                <a:latin typeface="+mj-lt"/>
-              </a:rPr>
-              <a:t>of</a:t>
-            </a:r>
-            <a:r>
-              <a:rPr lang="de-CH" dirty="0">
-                <a:solidFill>
-                  <a:schemeClr val="tx1">
-                    <a:lumMod val="65000"/>
-                    <a:lumOff val="35000"/>
-                  </a:schemeClr>
-                </a:solidFill>
-                <a:latin typeface="+mj-lt"/>
-              </a:rPr>
-              <a:t> </a:t>
-            </a:r>
-            <a:r>
-              <a:rPr lang="de-CH" dirty="0" err="1">
-                <a:solidFill>
-                  <a:schemeClr val="tx1">
-                    <a:lumMod val="65000"/>
-                    <a:lumOff val="35000"/>
-                  </a:schemeClr>
-                </a:solidFill>
-                <a:latin typeface="+mj-lt"/>
-              </a:rPr>
               <a:t>medication</a:t>
             </a:r>
             <a:endParaRPr lang="de-CH" dirty="0">
@@ -6139,6 +6163,18 @@
           <a:p>
             <a:pPr algn="just"/>
             <a:r>
+              <a:rPr lang="en-US" b="1" dirty="0">
+                <a:solidFill>
+                  <a:schemeClr val="tx1">
+                    <a:lumMod val="65000"/>
+                    <a:lumOff val="35000"/>
+                  </a:schemeClr>
+                </a:solidFill>
+                <a:latin typeface="+mj-lt"/>
+              </a:rPr>
+              <a:t>High manual workload </a:t>
+            </a:r>
+            <a:r>
               <a:rPr lang="en-US" dirty="0">
                 <a:solidFill>
                   <a:schemeClr val="tx1">
@@ -6148,7 +6184,7 @@
                 </a:solidFill>
                 <a:latin typeface="+mj-lt"/>
               </a:rPr>
-              <a:t>High manual workload leads to cutbacks in providing personal consultation to patients</a:t>
+              <a:t>leads to cutbacks in providing personal consultation to patients</a:t>
             </a:r>
             <a:endParaRPr lang="de-CH" dirty="0">
               <a:solidFill>
@@ -6525,7 +6561,7 @@
         <p:spPr>
           <a:xfrm>
             <a:off x="6398971" y="2250006"/>
-            <a:ext cx="4800344" cy="646331"/>
+            <a:ext cx="4959310" cy="646331"/>
           </a:xfrm>
           <a:prstGeom prst="rect">
             <a:avLst/>
@@ -6549,7 +6585,19 @@
                 </a:solidFill>
                 <a:latin typeface="+mj-lt"/>
               </a:rPr>
-              <a:t>Expand customer base by implementing an online purchasing solution</a:t>
+              <a:t>Expand customer base by implementing an </a:t>
+            </a:r>
+            <a:r>
+              <a:rPr lang="en-GB" b="1" dirty="0">
+                <a:solidFill>
+                  <a:schemeClr val="tx1">
+                    <a:lumMod val="65000"/>
+                    <a:lumOff val="35000"/>
+                  </a:schemeClr>
+                </a:solidFill>
+                <a:latin typeface="+mj-lt"/>
+              </a:rPr>
+              <a:t>online purchasing solution</a:t>
             </a:r>
           </a:p>
         </p:txBody>
@@ -6569,7 +6617,7 @@
         <p:spPr>
           <a:xfrm>
             <a:off x="6398971" y="3537446"/>
-            <a:ext cx="4800344" cy="646331"/>
+            <a:ext cx="4959310" cy="646331"/>
           </a:xfrm>
           <a:prstGeom prst="rect">
             <a:avLst/>
@@ -6593,40 +6641,20 @@
                 </a:solidFill>
                 <a:latin typeface="+mj-lt"/>
               </a:rPr>
-              <a:t>Creating a single source of truth by storing necessary data in a relational database</a:t>
-            </a:r>
-          </a:p>
-        </p:txBody>
-      </p:sp>
-      <p:sp>
-        <p:nvSpPr>
-          <p:cNvPr id="22" name="TextBox 21">
-            <a:extLst>
-              <a:ext uri="{FF2B5EF4-FFF2-40B4-BE49-F238E27FC236}">
-                <a16:creationId xmlns:a16="http://schemas.microsoft.com/office/drawing/2014/main" id="{AC50772B-5484-4E52-BC48-48204701BFF4}"/>
-              </a:ext>
-            </a:extLst>
-          </p:cNvPr>
-          <p:cNvSpPr txBox="1"/>
-          <p:nvPr/>
-        </p:nvSpPr>
-        <p:spPr>
-          <a:xfrm>
-            <a:off x="6398971" y="4824886"/>
-            <a:ext cx="4800344" cy="646331"/>
-          </a:xfrm>
-          <a:prstGeom prst="rect">
-            <a:avLst/>
-          </a:prstGeom>
-          <a:noFill/>
-        </p:spPr>
-        <p:txBody>
-          <a:bodyPr wrap="square">
-            <a:spAutoFit/>
-          </a:bodyPr>
-          <a:lstStyle/>
-          <a:p>
-            <a:pPr lvl="1" algn="just"/>
+              <a:t>Creating a </a:t>
+            </a:r>
+            <a:r>
+              <a:rPr lang="en-GB" b="1" dirty="0">
+                <a:solidFill>
+                  <a:schemeClr val="tx1">
+                    <a:lumMod val="65000"/>
+                    <a:lumOff val="35000"/>
+                  </a:schemeClr>
+                </a:solidFill>
+                <a:latin typeface="+mj-lt"/>
+              </a:rPr>
+              <a:t>single source of truth </a:t>
+            </a:r>
             <a:r>
               <a:rPr lang="en-GB" dirty="0">
                 <a:solidFill>
@@ -6637,7 +6665,63 @@
                 </a:solidFill>
                 <a:latin typeface="+mj-lt"/>
               </a:rPr>
-              <a:t>Reducing the manual workload by automating the process of selling medication</a:t>
+              <a:t>by storing necessary data in a relational database</a:t>
+            </a:r>
+          </a:p>
+        </p:txBody>
+      </p:sp>
+      <p:sp>
+        <p:nvSpPr>
+          <p:cNvPr id="22" name="TextBox 21">
+            <a:extLst>
+              <a:ext uri="{FF2B5EF4-FFF2-40B4-BE49-F238E27FC236}">
+                <a16:creationId xmlns:a16="http://schemas.microsoft.com/office/drawing/2014/main" id="{AC50772B-5484-4E52-BC48-48204701BFF4}"/>
+              </a:ext>
+            </a:extLst>
+          </p:cNvPr>
+          <p:cNvSpPr txBox="1"/>
+          <p:nvPr/>
+        </p:nvSpPr>
+        <p:spPr>
+          <a:xfrm>
+            <a:off x="6398970" y="4824886"/>
+            <a:ext cx="4959311" cy="646331"/>
+          </a:xfrm>
+          <a:prstGeom prst="rect">
+            <a:avLst/>
+          </a:prstGeom>
+          <a:noFill/>
+        </p:spPr>
+        <p:txBody>
+          <a:bodyPr wrap="square">
+            <a:spAutoFit/>
+          </a:bodyPr>
+          <a:lstStyle/>
+          <a:p>
+            <a:pPr lvl="1" algn="just"/>
+            <a:r>
+              <a:rPr lang="en-GB" b="1" dirty="0">
+                <a:solidFill>
+                  <a:schemeClr val="tx1">
+                    <a:lumMod val="65000"/>
+                    <a:lumOff val="35000"/>
+                  </a:schemeClr>
+                </a:solidFill>
+                <a:latin typeface="+mj-lt"/>
+              </a:rPr>
+              <a:t>Reducing the manual workload </a:t>
+            </a:r>
+            <a:r>
+              <a:rPr lang="en-GB" dirty="0">
+                <a:solidFill>
+                  <a:schemeClr val="tx1">
+                    <a:lumMod val="65000"/>
+                    <a:lumOff val="35000"/>
+                  </a:schemeClr>
+                </a:solidFill>
+                <a:latin typeface="+mj-lt"/>
+              </a:rPr>
+              <a:t>by automating the process of selling medication</a:t>
             </a:r>
           </a:p>
         </p:txBody>
@@ -6776,60 +6860,6 @@
           <a:chExt cx="0" cy="0"/>
         </a:xfrm>
       </p:grpSpPr>
-      <p:sp>
-        <p:nvSpPr>
-          <p:cNvPr id="2" name="Title 1">
-            <a:extLst>
-              <a:ext uri="{FF2B5EF4-FFF2-40B4-BE49-F238E27FC236}">
-                <a16:creationId xmlns:a16="http://schemas.microsoft.com/office/drawing/2014/main" id="{D172D38F-436D-4343-83E4-DC0887B22196}"/>
-              </a:ext>
-            </a:extLst>
-          </p:cNvPr>
-          <p:cNvSpPr>
-            <a:spLocks noGrp="1"/>
-          </p:cNvSpPr>
-          <p:nvPr>
-            <p:ph type="title"/>
-          </p:nvPr>
-        </p:nvSpPr>
-        <p:spPr>
-          <a:xfrm>
-            <a:off x="0" y="0"/>
-            <a:ext cx="12192000" cy="1104899"/>
-          </a:xfrm>
-        </p:spPr>
-        <p:txBody>
-          <a:bodyPr/>
-          <a:lstStyle/>
-          <a:p>
-            <a:pPr algn="ctr"/>
-            <a:r>
-              <a:rPr lang="en-GB" b="1" dirty="0">
-                <a:solidFill>
-                  <a:schemeClr val="tx1">
-                    <a:lumMod val="65000"/>
-                    <a:lumOff val="35000"/>
-                  </a:schemeClr>
-                </a:solidFill>
-                <a:latin typeface="Century Gothic" panose="020B0502020202020204" pitchFamily="34" charset="0"/>
-              </a:rPr>
-              <a:t>Pharmacy</a:t>
-            </a:r>
-            <a:r>
-              <a:rPr lang="en-CH" b="1" dirty="0">
-                <a:solidFill>
-                  <a:schemeClr val="tx1">
-                    <a:lumMod val="65000"/>
-                    <a:lumOff val="35000"/>
-                  </a:schemeClr>
-                </a:solidFill>
-                <a:latin typeface="Century Gothic" panose="020B0502020202020204" pitchFamily="34" charset="0"/>
-              </a:rPr>
-              <a:t> Journey</a:t>
-            </a:r>
-          </a:p>
-        </p:txBody>
-      </p:sp>
       <p:pic>
         <p:nvPicPr>
           <p:cNvPr id="10" name="Picture 9" descr="A picture containing diagram&#10;&#10;Description automatically generated">
@@ -6852,14 +6882,68 @@
         </p:blipFill>
         <p:spPr>
           <a:xfrm>
-            <a:off x="388620" y="1021079"/>
-            <a:ext cx="8884920" cy="5266334"/>
+            <a:off x="271153" y="439998"/>
+            <a:ext cx="10540554" cy="6247673"/>
           </a:xfrm>
           <a:prstGeom prst="rect">
             <a:avLst/>
           </a:prstGeom>
         </p:spPr>
       </p:pic>
+      <p:sp>
+        <p:nvSpPr>
+          <p:cNvPr id="2" name="Title 1">
+            <a:extLst>
+              <a:ext uri="{FF2B5EF4-FFF2-40B4-BE49-F238E27FC236}">
+                <a16:creationId xmlns:a16="http://schemas.microsoft.com/office/drawing/2014/main" id="{D172D38F-436D-4343-83E4-DC0887B22196}"/>
+              </a:ext>
+            </a:extLst>
+          </p:cNvPr>
+          <p:cNvSpPr>
+            <a:spLocks noGrp="1"/>
+          </p:cNvSpPr>
+          <p:nvPr>
+            <p:ph type="title"/>
+          </p:nvPr>
+        </p:nvSpPr>
+        <p:spPr>
+          <a:xfrm>
+            <a:off x="0" y="0"/>
+            <a:ext cx="12192000" cy="1104899"/>
+          </a:xfrm>
+        </p:spPr>
+        <p:txBody>
+          <a:bodyPr/>
+          <a:lstStyle/>
+          <a:p>
+            <a:pPr algn="ctr"/>
+            <a:r>
+              <a:rPr lang="en-GB" b="1" dirty="0">
+                <a:solidFill>
+                  <a:schemeClr val="tx1">
+                    <a:lumMod val="65000"/>
+                    <a:lumOff val="35000"/>
+                  </a:schemeClr>
+                </a:solidFill>
+                <a:latin typeface="Century Gothic" panose="020B0502020202020204" pitchFamily="34" charset="0"/>
+              </a:rPr>
+              <a:t>Pharmacy</a:t>
+            </a:r>
+            <a:r>
+              <a:rPr lang="en-CH" b="1" dirty="0">
+                <a:solidFill>
+                  <a:schemeClr val="tx1">
+                    <a:lumMod val="65000"/>
+                    <a:lumOff val="35000"/>
+                  </a:schemeClr>
+                </a:solidFill>
+                <a:latin typeface="Century Gothic" panose="020B0502020202020204" pitchFamily="34" charset="0"/>
+              </a:rPr>
+              <a:t> Journey</a:t>
+            </a:r>
+          </a:p>
+        </p:txBody>
+      </p:sp>
       <p:grpSp>
         <p:nvGrpSpPr>
           <p:cNvPr id="16" name="Group 15">
@@ -7155,6 +7239,35 @@
           <a:chExt cx="0" cy="0"/>
         </a:xfrm>
       </p:grpSpPr>
+      <p:pic>
+        <p:nvPicPr>
+          <p:cNvPr id="17" name="Picture 16" descr="Diagram&#10;&#10;Description automatically generated">
+            <a:extLst>
+              <a:ext uri="{FF2B5EF4-FFF2-40B4-BE49-F238E27FC236}">
+                <a16:creationId xmlns:a16="http://schemas.microsoft.com/office/drawing/2014/main" id="{EC92477B-C48C-481D-80BB-800C0C23DDBF}"/>
+              </a:ext>
+            </a:extLst>
+          </p:cNvPr>
+          <p:cNvPicPr>
+            <a:picLocks noChangeAspect="1"/>
+          </p:cNvPicPr>
+          <p:nvPr/>
+        </p:nvPicPr>
+        <p:blipFill rotWithShape="1">
+          <a:blip r:embed="rId3"/>
+          <a:srcRect t="14667" r="8487" b="25222"/>
+          <a:stretch/>
+        </p:blipFill>
+        <p:spPr>
+          <a:xfrm>
+            <a:off x="2747261" y="1483660"/>
+            <a:ext cx="9086151" cy="4611893"/>
+          </a:xfrm>
+          <a:prstGeom prst="rect">
+            <a:avLst/>
+          </a:prstGeom>
+        </p:spPr>
+      </p:pic>
       <p:sp>
         <p:nvSpPr>
           <p:cNvPr id="2" name="Title 1">
@@ -7212,7 +7325,7 @@
           <p:nvPr/>
         </p:nvPicPr>
         <p:blipFill>
-          <a:blip r:embed="rId3"/>
+          <a:blip r:embed="rId4"/>
           <a:stretch>
             <a:fillRect/>
           </a:stretch>
@@ -7262,7 +7375,7 @@
             <p:nvPr/>
           </p:nvPicPr>
           <p:blipFill>
-            <a:blip r:embed="rId4">
+            <a:blip r:embed="rId5">
               <a:extLst>
                 <a:ext uri="{28A0092B-C50C-407E-A947-70E740481C1C}">
                   <a14:useLocalDpi xmlns:a14="http://schemas.microsoft.com/office/drawing/2010/main" val="0"/>
@@ -7810,35 +7923,6 @@
           </p:txBody>
         </p:sp>
       </p:grpSp>
-      <p:pic>
-        <p:nvPicPr>
-          <p:cNvPr id="17" name="Picture 16" descr="Diagram&#10;&#10;Description automatically generated">
-            <a:extLst>
-              <a:ext uri="{FF2B5EF4-FFF2-40B4-BE49-F238E27FC236}">
-                <a16:creationId xmlns:a16="http://schemas.microsoft.com/office/drawing/2014/main" id="{EC92477B-C48C-481D-80BB-800C0C23DDBF}"/>
-              </a:ext>
-            </a:extLst>
-          </p:cNvPr>
-          <p:cNvPicPr>
-            <a:picLocks noChangeAspect="1"/>
-          </p:cNvPicPr>
-          <p:nvPr/>
-        </p:nvPicPr>
-        <p:blipFill rotWithShape="1">
-          <a:blip r:embed="rId5"/>
-          <a:srcRect t="14667" b="25222"/>
-          <a:stretch/>
-        </p:blipFill>
-        <p:spPr>
-          <a:xfrm>
-            <a:off x="3316941" y="1798320"/>
-            <a:ext cx="8875059" cy="4122420"/>
-          </a:xfrm>
-          <a:prstGeom prst="rect">
-            <a:avLst/>
-          </a:prstGeom>
-        </p:spPr>
-      </p:pic>
     </p:spTree>
     <p:extLst>
       <p:ext uri="{BB962C8B-B14F-4D97-AF65-F5344CB8AC3E}">
@@ -8118,7 +8202,7 @@
           </a:fontRef>
         </p:style>
         <p:txBody>
-          <a:bodyPr rtlCol="0" anchor="ctr"/>
+          <a:bodyPr rtlCol="0" anchor="t"/>
           <a:lstStyle/>
           <a:p>
             <a:pPr algn="just">
@@ -8130,13 +8214,61 @@
               <a:rPr lang="en-GB" dirty="0">
                 <a:solidFill>
                   <a:schemeClr val="tx1">
-                    <a:lumMod val="65000"/>
-                    <a:lumOff val="35000"/>
+                    <a:lumMod val="95000"/>
+                    <a:lumOff val="5000"/>
                   </a:schemeClr>
                 </a:solidFill>
                 <a:latin typeface="+mj-lt"/>
               </a:rPr>
-              <a:t>Digital Pharmacy uses Google Cloud Vision to automatically process received prescriptions and extract all necessary information from the file, regardless if it’s a digital pdf or a scan. Google Cloud Vision is a cutting edge AI application that is able to recognize characters in documents and images and extract them. </a:t>
+              <a:t>Digital Pharmacy uses</a:t>
+            </a:r>
+            <a:r>
+              <a:rPr lang="en-GB" b="1" dirty="0">
+                <a:solidFill>
+                  <a:schemeClr val="tx1">
+                    <a:lumMod val="95000"/>
+                    <a:lumOff val="5000"/>
+                  </a:schemeClr>
+                </a:solidFill>
+                <a:latin typeface="+mj-lt"/>
+              </a:rPr>
+              <a:t> Google Cloud Vision </a:t>
+            </a:r>
+            <a:r>
+              <a:rPr lang="en-GB" dirty="0">
+                <a:solidFill>
+                  <a:schemeClr val="tx1">
+                    <a:lumMod val="95000"/>
+                    <a:lumOff val="5000"/>
+                  </a:schemeClr>
+                </a:solidFill>
+                <a:latin typeface="+mj-lt"/>
+              </a:rPr>
+              <a:t>to automatically process received prescriptions and extract all necessary information from the file, regardless if it’s a digital pdf or a scan. Google Cloud Vision is </a:t>
+            </a:r>
+            <a:r>
+              <a:rPr lang="en-GB" b="1" dirty="0">
+                <a:solidFill>
+                  <a:schemeClr val="tx1">
+                    <a:lumMod val="95000"/>
+                    <a:lumOff val="5000"/>
+                  </a:schemeClr>
+                </a:solidFill>
+                <a:latin typeface="+mj-lt"/>
+              </a:rPr>
+              <a:t>a cutting edge AI application</a:t>
+            </a:r>
+            <a:r>
+              <a:rPr lang="en-GB" dirty="0">
+                <a:solidFill>
+                  <a:schemeClr val="tx1">
+                    <a:lumMod val="95000"/>
+                    <a:lumOff val="5000"/>
+                  </a:schemeClr>
+                </a:solidFill>
+                <a:latin typeface="+mj-lt"/>
+              </a:rPr>
+              <a:t> that is able to recognize characters in documents and images and extract them. </a:t>
             </a:r>
           </a:p>
         </p:txBody>
@@ -8190,7 +8322,7 @@
           </a:fontRef>
         </p:style>
         <p:txBody>
-          <a:bodyPr rtlCol="0" anchor="ctr"/>
+          <a:bodyPr rtlCol="0" anchor="t"/>
           <a:lstStyle/>
           <a:p>
             <a:pPr algn="just">
@@ -8202,8 +8334,8 @@
               <a:rPr lang="en-GB" dirty="0">
                 <a:solidFill>
                   <a:schemeClr val="tx1">
-                    <a:lumMod val="65000"/>
-                    <a:lumOff val="35000"/>
+                    <a:lumMod val="95000"/>
+                    <a:lumOff val="5000"/>
                   </a:schemeClr>
                 </a:solidFill>
                 <a:latin typeface="+mj-lt"/>
@@ -8211,11 +8343,11 @@
               <a:t>Digital Pharmacy uses </a:t>
             </a:r>
             <a:r>
-              <a:rPr lang="en-GB" dirty="0" err="1">
+              <a:rPr lang="en-GB" b="1" dirty="0" err="1">
                 <a:solidFill>
                   <a:schemeClr val="tx1">
-                    <a:lumMod val="65000"/>
-                    <a:lumOff val="35000"/>
+                    <a:lumMod val="95000"/>
+                    <a:lumOff val="5000"/>
                   </a:schemeClr>
                 </a:solidFill>
                 <a:latin typeface="+mj-lt"/>
@@ -8223,23 +8355,35 @@
               <a:t>AirTable</a:t>
             </a:r>
             <a:r>
-              <a:rPr lang="en-GB" dirty="0">
+              <a:rPr lang="en-GB" b="1" dirty="0">
                 <a:solidFill>
                   <a:schemeClr val="tx1">
-                    <a:lumMod val="65000"/>
-                    <a:lumOff val="35000"/>
+                    <a:lumMod val="95000"/>
+                    <a:lumOff val="5000"/>
                   </a:schemeClr>
                 </a:solidFill>
                 <a:latin typeface="+mj-lt"/>
               </a:rPr>
-              <a:t> to store the overview of drugs, if they need a prescription or not and their stock level as well as patient data for prescription orders. </a:t>
+              <a:t> to store the overview of drugs</a:t>
+            </a:r>
+            <a:r>
+              <a:rPr lang="en-GB" dirty="0">
+                <a:solidFill>
+                  <a:schemeClr val="tx1">
+                    <a:lumMod val="95000"/>
+                    <a:lumOff val="5000"/>
+                  </a:schemeClr>
+                </a:solidFill>
+                <a:latin typeface="+mj-lt"/>
+              </a:rPr>
+              <a:t>, if they need a prescription or not and their stock level as well as patient data for prescription orders. </a:t>
             </a:r>
             <a:r>
               <a:rPr lang="en-GB" dirty="0" err="1">
                 <a:solidFill>
                   <a:schemeClr val="tx1">
-                    <a:lumMod val="65000"/>
-                    <a:lumOff val="35000"/>
+                    <a:lumMod val="95000"/>
+                    <a:lumOff val="5000"/>
                   </a:schemeClr>
                 </a:solidFill>
                 <a:latin typeface="+mj-lt"/>
@@ -8250,13 +8394,61 @@
               <a:rPr lang="en-GB" dirty="0">
                 <a:solidFill>
                   <a:schemeClr val="tx1">
-                    <a:lumMod val="65000"/>
-                    <a:lumOff val="35000"/>
+                    <a:lumMod val="95000"/>
+                    <a:lumOff val="5000"/>
                   </a:schemeClr>
                 </a:solidFill>
                 <a:latin typeface="+mj-lt"/>
               </a:rPr>
-              <a:t> allows to build relational database with the option to chose between a no-code and traditional SQL language implementation. Like this, Digital Pharmacy can ensure that the database can be managed by a small pharmacy without an IT specialist, but can also be used as a fully functional SQL database if needed.</a:t>
+              <a:t> allows to build </a:t>
+            </a:r>
+            <a:r>
+              <a:rPr lang="en-GB" b="1" dirty="0">
+                <a:solidFill>
+                  <a:schemeClr val="tx1">
+                    <a:lumMod val="95000"/>
+                    <a:lumOff val="5000"/>
+                  </a:schemeClr>
+                </a:solidFill>
+                <a:latin typeface="+mj-lt"/>
+              </a:rPr>
+              <a:t>relational database </a:t>
+            </a:r>
+            <a:r>
+              <a:rPr lang="en-GB" dirty="0">
+                <a:solidFill>
+                  <a:schemeClr val="tx1">
+                    <a:lumMod val="95000"/>
+                    <a:lumOff val="5000"/>
+                  </a:schemeClr>
+                </a:solidFill>
+                <a:latin typeface="+mj-lt"/>
+              </a:rPr>
+              <a:t>with the option to chose between a no-code and traditional SQL language implementation. Like this, Digital Pharmacy can ensure that the database </a:t>
+            </a:r>
+            <a:r>
+              <a:rPr lang="en-GB" b="1" dirty="0">
+                <a:solidFill>
+                  <a:schemeClr val="tx1">
+                    <a:lumMod val="95000"/>
+                    <a:lumOff val="5000"/>
+                  </a:schemeClr>
+                </a:solidFill>
+                <a:latin typeface="+mj-lt"/>
+              </a:rPr>
+              <a:t>can be managed by a small pharmacy without an IT specialist</a:t>
+            </a:r>
+            <a:r>
+              <a:rPr lang="en-GB" dirty="0">
+                <a:solidFill>
+                  <a:schemeClr val="tx1">
+                    <a:lumMod val="95000"/>
+                    <a:lumOff val="5000"/>
+                  </a:schemeClr>
+                </a:solidFill>
+                <a:latin typeface="+mj-lt"/>
+              </a:rPr>
+              <a:t>, but can also be used as a fully functional SQL database if needed.</a:t>
             </a:r>
           </a:p>
         </p:txBody>

</xml_diff>